<commit_message>
updates exercises and joins lesson
</commit_message>
<xml_diff>
--- a/1_Why_R/R_for_STATCAN.pptx
+++ b/1_Why_R/R_for_STATCAN.pptx
@@ -6,7 +6,7 @@
     <p:sldMasterId id="2147483660" r:id="rId2"/>
   </p:sldMasterIdLst>
   <p:notesMasterIdLst>
-    <p:notesMasterId r:id="rId18"/>
+    <p:notesMasterId r:id="rId17"/>
   </p:notesMasterIdLst>
   <p:sldIdLst>
     <p:sldId id="271" r:id="rId3"/>
@@ -23,7 +23,6 @@
     <p:sldId id="268" r:id="rId14"/>
     <p:sldId id="259" r:id="rId15"/>
     <p:sldId id="270" r:id="rId16"/>
-    <p:sldId id="272" r:id="rId17"/>
   </p:sldIdLst>
   <p:sldSz cx="12192000" cy="6858000"/>
   <p:notesSz cx="6858000" cy="9144000"/>
@@ -223,7 +222,7 @@
           <a:p>
             <a:fld id="{8852C0E4-5305-FA45-929F-50400F6D1609}" type="datetimeFigureOut">
               <a:rPr lang="en-US" smtClean="0"/>
-              <a:t>1/17/2020</a:t>
+              <a:t>2/12/2020</a:t>
             </a:fld>
             <a:endParaRPr lang="en-US"/>
           </a:p>
@@ -1822,7 +1821,7 @@
           <a:p>
             <a:fld id="{A7818830-1741-9145-85B6-1992E2E577A1}" type="datetimeFigureOut">
               <a:rPr lang="en-US" smtClean="0"/>
-              <a:t>1/17/2020</a:t>
+              <a:t>2/12/2020</a:t>
             </a:fld>
             <a:endParaRPr lang="en-US"/>
           </a:p>
@@ -1992,7 +1991,7 @@
           <a:p>
             <a:fld id="{A7818830-1741-9145-85B6-1992E2E577A1}" type="datetimeFigureOut">
               <a:rPr lang="en-US" smtClean="0"/>
-              <a:t>1/17/2020</a:t>
+              <a:t>2/12/2020</a:t>
             </a:fld>
             <a:endParaRPr lang="en-US"/>
           </a:p>
@@ -2172,7 +2171,7 @@
           <a:p>
             <a:fld id="{A7818830-1741-9145-85B6-1992E2E577A1}" type="datetimeFigureOut">
               <a:rPr lang="en-US" smtClean="0"/>
-              <a:t>1/17/2020</a:t>
+              <a:t>2/12/2020</a:t>
             </a:fld>
             <a:endParaRPr lang="en-US"/>
           </a:p>
@@ -2255,7 +2254,7 @@
           <p:cNvPr id="2" name="Title 1">
             <a:extLst>
               <a:ext uri="{FF2B5EF4-FFF2-40B4-BE49-F238E27FC236}">
-                <a16:creationId xmlns:a16="http://schemas.microsoft.com/office/drawing/2014/main" xmlns="" id="{7DC010DF-92C9-D745-A3CA-6B1713C25B63}"/>
+                <a16:creationId xmlns="" xmlns:a16="http://schemas.microsoft.com/office/drawing/2014/main" id="{7DC010DF-92C9-D745-A3CA-6B1713C25B63}"/>
               </a:ext>
             </a:extLst>
           </p:cNvPr>
@@ -2299,7 +2298,7 @@
           <p:cNvPr id="3" name="Subtitle 2">
             <a:extLst>
               <a:ext uri="{FF2B5EF4-FFF2-40B4-BE49-F238E27FC236}">
-                <a16:creationId xmlns:a16="http://schemas.microsoft.com/office/drawing/2014/main" xmlns="" id="{2CF005DD-11F8-9245-B26B-41D1F4F84416}"/>
+                <a16:creationId xmlns="" xmlns:a16="http://schemas.microsoft.com/office/drawing/2014/main" id="{2CF005DD-11F8-9245-B26B-41D1F4F84416}"/>
               </a:ext>
             </a:extLst>
           </p:cNvPr>
@@ -2376,7 +2375,7 @@
           <p:cNvPr id="7" name="Subtitle 2">
             <a:extLst>
               <a:ext uri="{FF2B5EF4-FFF2-40B4-BE49-F238E27FC236}">
-                <a16:creationId xmlns:a16="http://schemas.microsoft.com/office/drawing/2014/main" xmlns="" id="{7AF7FE24-A452-0441-B567-CCDDCB585D4D}"/>
+                <a16:creationId xmlns="" xmlns:a16="http://schemas.microsoft.com/office/drawing/2014/main" id="{7AF7FE24-A452-0441-B567-CCDDCB585D4D}"/>
               </a:ext>
             </a:extLst>
           </p:cNvPr>
@@ -2616,7 +2615,7 @@
           <p:cNvPr id="4" name="Oval 3">
             <a:extLst>
               <a:ext uri="{FF2B5EF4-FFF2-40B4-BE49-F238E27FC236}">
-                <a16:creationId xmlns:a16="http://schemas.microsoft.com/office/drawing/2014/main" xmlns="" id="{13F61CBC-24C3-6947-ADAA-A50B14E242EC}"/>
+                <a16:creationId xmlns="" xmlns:a16="http://schemas.microsoft.com/office/drawing/2014/main" id="{13F61CBC-24C3-6947-ADAA-A50B14E242EC}"/>
               </a:ext>
             </a:extLst>
           </p:cNvPr>
@@ -2701,7 +2700,7 @@
           <p:cNvPr id="5" name="Picture 4">
             <a:extLst>
               <a:ext uri="{FF2B5EF4-FFF2-40B4-BE49-F238E27FC236}">
-                <a16:creationId xmlns:a16="http://schemas.microsoft.com/office/drawing/2014/main" xmlns="" id="{FFA6D2B1-9B37-5E4F-8A69-85E89D822DD6}"/>
+                <a16:creationId xmlns="" xmlns:a16="http://schemas.microsoft.com/office/drawing/2014/main" id="{FFA6D2B1-9B37-5E4F-8A69-85E89D822DD6}"/>
               </a:ext>
             </a:extLst>
           </p:cNvPr>
@@ -2731,7 +2730,7 @@
           <p:cNvPr id="2" name="Title 1">
             <a:extLst>
               <a:ext uri="{FF2B5EF4-FFF2-40B4-BE49-F238E27FC236}">
-                <a16:creationId xmlns:a16="http://schemas.microsoft.com/office/drawing/2014/main" xmlns="" id="{34F190F8-0D08-1945-8123-F4A12E3B914A}"/>
+                <a16:creationId xmlns="" xmlns:a16="http://schemas.microsoft.com/office/drawing/2014/main" id="{34F190F8-0D08-1945-8123-F4A12E3B914A}"/>
               </a:ext>
             </a:extLst>
           </p:cNvPr>
@@ -2775,7 +2774,7 @@
           <p:cNvPr id="3" name="Content Placeholder 2">
             <a:extLst>
               <a:ext uri="{FF2B5EF4-FFF2-40B4-BE49-F238E27FC236}">
-                <a16:creationId xmlns:a16="http://schemas.microsoft.com/office/drawing/2014/main" xmlns="" id="{35D0CB7B-8791-AE45-8FD2-E35F039282BC}"/>
+                <a16:creationId xmlns="" xmlns:a16="http://schemas.microsoft.com/office/drawing/2014/main" id="{35D0CB7B-8791-AE45-8FD2-E35F039282BC}"/>
               </a:ext>
             </a:extLst>
           </p:cNvPr>
@@ -2869,7 +2868,7 @@
           <p:cNvPr id="9" name="Subtitle 2">
             <a:extLst>
               <a:ext uri="{FF2B5EF4-FFF2-40B4-BE49-F238E27FC236}">
-                <a16:creationId xmlns:a16="http://schemas.microsoft.com/office/drawing/2014/main" xmlns="" id="{00B9A835-E3AD-6541-8CB7-FBAC3331BF73}"/>
+                <a16:creationId xmlns="" xmlns:a16="http://schemas.microsoft.com/office/drawing/2014/main" id="{00B9A835-E3AD-6541-8CB7-FBAC3331BF73}"/>
               </a:ext>
             </a:extLst>
           </p:cNvPr>
@@ -3111,7 +3110,7 @@
           <p:cNvPr id="10" name="Oval 9">
             <a:extLst>
               <a:ext uri="{FF2B5EF4-FFF2-40B4-BE49-F238E27FC236}">
-                <a16:creationId xmlns:a16="http://schemas.microsoft.com/office/drawing/2014/main" xmlns="" id="{A5821909-D323-1645-A122-4B1ED2F7EBAF}"/>
+                <a16:creationId xmlns="" xmlns:a16="http://schemas.microsoft.com/office/drawing/2014/main" id="{A5821909-D323-1645-A122-4B1ED2F7EBAF}"/>
               </a:ext>
             </a:extLst>
           </p:cNvPr>
@@ -3196,7 +3195,7 @@
           <p:cNvPr id="6" name="Picture 5">
             <a:extLst>
               <a:ext uri="{FF2B5EF4-FFF2-40B4-BE49-F238E27FC236}">
-                <a16:creationId xmlns:a16="http://schemas.microsoft.com/office/drawing/2014/main" xmlns="" id="{EAB4108C-F476-0341-8E99-768A37C3261A}"/>
+                <a16:creationId xmlns="" xmlns:a16="http://schemas.microsoft.com/office/drawing/2014/main" id="{EAB4108C-F476-0341-8E99-768A37C3261A}"/>
               </a:ext>
             </a:extLst>
           </p:cNvPr>
@@ -3226,7 +3225,7 @@
           <p:cNvPr id="2" name="Title 1">
             <a:extLst>
               <a:ext uri="{FF2B5EF4-FFF2-40B4-BE49-F238E27FC236}">
-                <a16:creationId xmlns:a16="http://schemas.microsoft.com/office/drawing/2014/main" xmlns="" id="{0CA85CE2-762B-9C4F-B29F-5D8A941A19DD}"/>
+                <a16:creationId xmlns="" xmlns:a16="http://schemas.microsoft.com/office/drawing/2014/main" id="{0CA85CE2-762B-9C4F-B29F-5D8A941A19DD}"/>
               </a:ext>
             </a:extLst>
           </p:cNvPr>
@@ -3270,7 +3269,7 @@
           <p:cNvPr id="3" name="Text Placeholder 2">
             <a:extLst>
               <a:ext uri="{FF2B5EF4-FFF2-40B4-BE49-F238E27FC236}">
-                <a16:creationId xmlns:a16="http://schemas.microsoft.com/office/drawing/2014/main" xmlns="" id="{9B547A7C-2582-B94D-B0CA-CE72B9DC3AC1}"/>
+                <a16:creationId xmlns="" xmlns:a16="http://schemas.microsoft.com/office/drawing/2014/main" id="{9B547A7C-2582-B94D-B0CA-CE72B9DC3AC1}"/>
               </a:ext>
             </a:extLst>
           </p:cNvPr>
@@ -3399,7 +3398,7 @@
           <p:cNvPr id="7" name="Subtitle 2">
             <a:extLst>
               <a:ext uri="{FF2B5EF4-FFF2-40B4-BE49-F238E27FC236}">
-                <a16:creationId xmlns:a16="http://schemas.microsoft.com/office/drawing/2014/main" xmlns="" id="{E759DBA7-AD2A-CA46-AC91-69C8DA7F52E9}"/>
+                <a16:creationId xmlns="" xmlns:a16="http://schemas.microsoft.com/office/drawing/2014/main" id="{E759DBA7-AD2A-CA46-AC91-69C8DA7F52E9}"/>
               </a:ext>
             </a:extLst>
           </p:cNvPr>
@@ -3641,7 +3640,7 @@
           <p:cNvPr id="11" name="Oval 10">
             <a:extLst>
               <a:ext uri="{FF2B5EF4-FFF2-40B4-BE49-F238E27FC236}">
-                <a16:creationId xmlns:a16="http://schemas.microsoft.com/office/drawing/2014/main" xmlns="" id="{80E6DEAE-E822-BC4C-A21C-32FD19CC5920}"/>
+                <a16:creationId xmlns="" xmlns:a16="http://schemas.microsoft.com/office/drawing/2014/main" id="{80E6DEAE-E822-BC4C-A21C-32FD19CC5920}"/>
               </a:ext>
             </a:extLst>
           </p:cNvPr>
@@ -3726,7 +3725,7 @@
           <p:cNvPr id="7" name="Picture 6">
             <a:extLst>
               <a:ext uri="{FF2B5EF4-FFF2-40B4-BE49-F238E27FC236}">
-                <a16:creationId xmlns:a16="http://schemas.microsoft.com/office/drawing/2014/main" xmlns="" id="{E1C660BE-2A45-C249-99DC-1113E65CE382}"/>
+                <a16:creationId xmlns="" xmlns:a16="http://schemas.microsoft.com/office/drawing/2014/main" id="{E1C660BE-2A45-C249-99DC-1113E65CE382}"/>
               </a:ext>
             </a:extLst>
           </p:cNvPr>
@@ -3756,7 +3755,7 @@
           <p:cNvPr id="2" name="Title 1">
             <a:extLst>
               <a:ext uri="{FF2B5EF4-FFF2-40B4-BE49-F238E27FC236}">
-                <a16:creationId xmlns:a16="http://schemas.microsoft.com/office/drawing/2014/main" xmlns="" id="{84D0AD4E-6AB3-214B-A4E4-E20A50DF7520}"/>
+                <a16:creationId xmlns="" xmlns:a16="http://schemas.microsoft.com/office/drawing/2014/main" id="{84D0AD4E-6AB3-214B-A4E4-E20A50DF7520}"/>
               </a:ext>
             </a:extLst>
           </p:cNvPr>
@@ -3800,7 +3799,7 @@
           <p:cNvPr id="3" name="Content Placeholder 2">
             <a:extLst>
               <a:ext uri="{FF2B5EF4-FFF2-40B4-BE49-F238E27FC236}">
-                <a16:creationId xmlns:a16="http://schemas.microsoft.com/office/drawing/2014/main" xmlns="" id="{393BFCDB-AC25-4845-93D8-4FE6A2452AF6}"/>
+                <a16:creationId xmlns="" xmlns:a16="http://schemas.microsoft.com/office/drawing/2014/main" id="{393BFCDB-AC25-4845-93D8-4FE6A2452AF6}"/>
               </a:ext>
             </a:extLst>
           </p:cNvPr>
@@ -3894,7 +3893,7 @@
           <p:cNvPr id="4" name="Content Placeholder 3">
             <a:extLst>
               <a:ext uri="{FF2B5EF4-FFF2-40B4-BE49-F238E27FC236}">
-                <a16:creationId xmlns:a16="http://schemas.microsoft.com/office/drawing/2014/main" xmlns="" id="{F2469439-F6DE-1C4F-BF69-06F3A410960A}"/>
+                <a16:creationId xmlns="" xmlns:a16="http://schemas.microsoft.com/office/drawing/2014/main" id="{F2469439-F6DE-1C4F-BF69-06F3A410960A}"/>
               </a:ext>
             </a:extLst>
           </p:cNvPr>
@@ -3988,7 +3987,7 @@
           <p:cNvPr id="8" name="Subtitle 2">
             <a:extLst>
               <a:ext uri="{FF2B5EF4-FFF2-40B4-BE49-F238E27FC236}">
-                <a16:creationId xmlns:a16="http://schemas.microsoft.com/office/drawing/2014/main" xmlns="" id="{F26EB97A-C08E-BB40-8591-561B47E85442}"/>
+                <a16:creationId xmlns="" xmlns:a16="http://schemas.microsoft.com/office/drawing/2014/main" id="{F26EB97A-C08E-BB40-8591-561B47E85442}"/>
               </a:ext>
             </a:extLst>
           </p:cNvPr>
@@ -4230,7 +4229,7 @@
           <p:cNvPr id="14" name="Oval 13">
             <a:extLst>
               <a:ext uri="{FF2B5EF4-FFF2-40B4-BE49-F238E27FC236}">
-                <a16:creationId xmlns:a16="http://schemas.microsoft.com/office/drawing/2014/main" xmlns="" id="{589D3108-C7BC-274D-B353-E84095136186}"/>
+                <a16:creationId xmlns="" xmlns:a16="http://schemas.microsoft.com/office/drawing/2014/main" id="{589D3108-C7BC-274D-B353-E84095136186}"/>
               </a:ext>
             </a:extLst>
           </p:cNvPr>
@@ -4315,7 +4314,7 @@
           <p:cNvPr id="10" name="Picture 9">
             <a:extLst>
               <a:ext uri="{FF2B5EF4-FFF2-40B4-BE49-F238E27FC236}">
-                <a16:creationId xmlns:a16="http://schemas.microsoft.com/office/drawing/2014/main" xmlns="" id="{F6B55718-4DF7-4641-854D-371CBB34D992}"/>
+                <a16:creationId xmlns="" xmlns:a16="http://schemas.microsoft.com/office/drawing/2014/main" id="{F6B55718-4DF7-4641-854D-371CBB34D992}"/>
               </a:ext>
             </a:extLst>
           </p:cNvPr>
@@ -4345,7 +4344,7 @@
           <p:cNvPr id="3" name="Text Placeholder 2">
             <a:extLst>
               <a:ext uri="{FF2B5EF4-FFF2-40B4-BE49-F238E27FC236}">
-                <a16:creationId xmlns:a16="http://schemas.microsoft.com/office/drawing/2014/main" xmlns="" id="{6025CCEC-8CE8-A349-8EF6-399A8DC9DAD6}"/>
+                <a16:creationId xmlns="" xmlns:a16="http://schemas.microsoft.com/office/drawing/2014/main" id="{6025CCEC-8CE8-A349-8EF6-399A8DC9DAD6}"/>
               </a:ext>
             </a:extLst>
           </p:cNvPr>
@@ -4423,7 +4422,7 @@
           <p:cNvPr id="4" name="Content Placeholder 3">
             <a:extLst>
               <a:ext uri="{FF2B5EF4-FFF2-40B4-BE49-F238E27FC236}">
-                <a16:creationId xmlns:a16="http://schemas.microsoft.com/office/drawing/2014/main" xmlns="" id="{18B6288D-1486-174E-8027-9566C127ED22}"/>
+                <a16:creationId xmlns="" xmlns:a16="http://schemas.microsoft.com/office/drawing/2014/main" id="{18B6288D-1486-174E-8027-9566C127ED22}"/>
               </a:ext>
             </a:extLst>
           </p:cNvPr>
@@ -4517,7 +4516,7 @@
           <p:cNvPr id="5" name="Text Placeholder 4">
             <a:extLst>
               <a:ext uri="{FF2B5EF4-FFF2-40B4-BE49-F238E27FC236}">
-                <a16:creationId xmlns:a16="http://schemas.microsoft.com/office/drawing/2014/main" xmlns="" id="{95847CF6-9394-5B4B-8220-7B71F29DB861}"/>
+                <a16:creationId xmlns="" xmlns:a16="http://schemas.microsoft.com/office/drawing/2014/main" id="{95847CF6-9394-5B4B-8220-7B71F29DB861}"/>
               </a:ext>
             </a:extLst>
           </p:cNvPr>
@@ -4595,7 +4594,7 @@
           <p:cNvPr id="6" name="Content Placeholder 5">
             <a:extLst>
               <a:ext uri="{FF2B5EF4-FFF2-40B4-BE49-F238E27FC236}">
-                <a16:creationId xmlns:a16="http://schemas.microsoft.com/office/drawing/2014/main" xmlns="" id="{1D0A9809-9CAB-EB48-A314-EFB972167AF3}"/>
+                <a16:creationId xmlns="" xmlns:a16="http://schemas.microsoft.com/office/drawing/2014/main" id="{1D0A9809-9CAB-EB48-A314-EFB972167AF3}"/>
               </a:ext>
             </a:extLst>
           </p:cNvPr>
@@ -4689,7 +4688,7 @@
           <p:cNvPr id="12" name="Title 1">
             <a:extLst>
               <a:ext uri="{FF2B5EF4-FFF2-40B4-BE49-F238E27FC236}">
-                <a16:creationId xmlns:a16="http://schemas.microsoft.com/office/drawing/2014/main" xmlns="" id="{585302A5-2089-074D-816D-EAD2D14CDF96}"/>
+                <a16:creationId xmlns="" xmlns:a16="http://schemas.microsoft.com/office/drawing/2014/main" id="{585302A5-2089-074D-816D-EAD2D14CDF96}"/>
               </a:ext>
             </a:extLst>
           </p:cNvPr>
@@ -4733,7 +4732,7 @@
           <p:cNvPr id="11" name="Subtitle 2">
             <a:extLst>
               <a:ext uri="{FF2B5EF4-FFF2-40B4-BE49-F238E27FC236}">
-                <a16:creationId xmlns:a16="http://schemas.microsoft.com/office/drawing/2014/main" xmlns="" id="{0AD77972-520F-AF4E-8A22-C728C2AC14D8}"/>
+                <a16:creationId xmlns="" xmlns:a16="http://schemas.microsoft.com/office/drawing/2014/main" id="{0AD77972-520F-AF4E-8A22-C728C2AC14D8}"/>
               </a:ext>
             </a:extLst>
           </p:cNvPr>
@@ -4975,7 +4974,7 @@
           <p:cNvPr id="9" name="Oval 8">
             <a:extLst>
               <a:ext uri="{FF2B5EF4-FFF2-40B4-BE49-F238E27FC236}">
-                <a16:creationId xmlns:a16="http://schemas.microsoft.com/office/drawing/2014/main" xmlns="" id="{ABC21F7E-58FE-D049-ABAE-1389E91681FF}"/>
+                <a16:creationId xmlns="" xmlns:a16="http://schemas.microsoft.com/office/drawing/2014/main" id="{ABC21F7E-58FE-D049-ABAE-1389E91681FF}"/>
               </a:ext>
             </a:extLst>
           </p:cNvPr>
@@ -5060,7 +5059,7 @@
           <p:cNvPr id="10" name="Picture 9">
             <a:extLst>
               <a:ext uri="{FF2B5EF4-FFF2-40B4-BE49-F238E27FC236}">
-                <a16:creationId xmlns:a16="http://schemas.microsoft.com/office/drawing/2014/main" xmlns="" id="{47E62E1B-1303-B847-9565-8804BE8714BC}"/>
+                <a16:creationId xmlns="" xmlns:a16="http://schemas.microsoft.com/office/drawing/2014/main" id="{47E62E1B-1303-B847-9565-8804BE8714BC}"/>
               </a:ext>
             </a:extLst>
           </p:cNvPr>
@@ -5090,7 +5089,7 @@
           <p:cNvPr id="8" name="Title 1">
             <a:extLst>
               <a:ext uri="{FF2B5EF4-FFF2-40B4-BE49-F238E27FC236}">
-                <a16:creationId xmlns:a16="http://schemas.microsoft.com/office/drawing/2014/main" xmlns="" id="{F8929614-25E8-7C40-B3D8-97B8D703FBC4}"/>
+                <a16:creationId xmlns="" xmlns:a16="http://schemas.microsoft.com/office/drawing/2014/main" id="{F8929614-25E8-7C40-B3D8-97B8D703FBC4}"/>
               </a:ext>
             </a:extLst>
           </p:cNvPr>
@@ -5134,7 +5133,7 @@
           <p:cNvPr id="6" name="Subtitle 2">
             <a:extLst>
               <a:ext uri="{FF2B5EF4-FFF2-40B4-BE49-F238E27FC236}">
-                <a16:creationId xmlns:a16="http://schemas.microsoft.com/office/drawing/2014/main" xmlns="" id="{FAD1A96F-BCA0-5B44-A660-370961E12B29}"/>
+                <a16:creationId xmlns="" xmlns:a16="http://schemas.microsoft.com/office/drawing/2014/main" id="{FAD1A96F-BCA0-5B44-A660-370961E12B29}"/>
               </a:ext>
             </a:extLst>
           </p:cNvPr>
@@ -5376,7 +5375,7 @@
           <p:cNvPr id="7" name="Oval 6">
             <a:extLst>
               <a:ext uri="{FF2B5EF4-FFF2-40B4-BE49-F238E27FC236}">
-                <a16:creationId xmlns:a16="http://schemas.microsoft.com/office/drawing/2014/main" xmlns="" id="{A660D6C4-DBDA-4A40-8D37-2E8A58676365}"/>
+                <a16:creationId xmlns="" xmlns:a16="http://schemas.microsoft.com/office/drawing/2014/main" id="{A660D6C4-DBDA-4A40-8D37-2E8A58676365}"/>
               </a:ext>
             </a:extLst>
           </p:cNvPr>
@@ -5461,7 +5460,7 @@
           <p:cNvPr id="4" name="Subtitle 2">
             <a:extLst>
               <a:ext uri="{FF2B5EF4-FFF2-40B4-BE49-F238E27FC236}">
-                <a16:creationId xmlns:a16="http://schemas.microsoft.com/office/drawing/2014/main" xmlns="" id="{BF815435-FE2C-3140-AA9C-30F368825C19}"/>
+                <a16:creationId xmlns="" xmlns:a16="http://schemas.microsoft.com/office/drawing/2014/main" id="{BF815435-FE2C-3140-AA9C-30F368825C19}"/>
               </a:ext>
             </a:extLst>
           </p:cNvPr>
@@ -5703,7 +5702,7 @@
           <p:cNvPr id="11" name="Oval 10">
             <a:extLst>
               <a:ext uri="{FF2B5EF4-FFF2-40B4-BE49-F238E27FC236}">
-                <a16:creationId xmlns:a16="http://schemas.microsoft.com/office/drawing/2014/main" xmlns="" id="{0AA04B89-FAE3-E84F-94AE-DE84F8329BE0}"/>
+                <a16:creationId xmlns="" xmlns:a16="http://schemas.microsoft.com/office/drawing/2014/main" id="{0AA04B89-FAE3-E84F-94AE-DE84F8329BE0}"/>
               </a:ext>
             </a:extLst>
           </p:cNvPr>
@@ -5788,7 +5787,7 @@
           <p:cNvPr id="7" name="Picture 6">
             <a:extLst>
               <a:ext uri="{FF2B5EF4-FFF2-40B4-BE49-F238E27FC236}">
-                <a16:creationId xmlns:a16="http://schemas.microsoft.com/office/drawing/2014/main" xmlns="" id="{2E1089AA-FF4A-0241-9193-920E050F54F6}"/>
+                <a16:creationId xmlns="" xmlns:a16="http://schemas.microsoft.com/office/drawing/2014/main" id="{2E1089AA-FF4A-0241-9193-920E050F54F6}"/>
               </a:ext>
             </a:extLst>
           </p:cNvPr>
@@ -5818,7 +5817,7 @@
           <p:cNvPr id="2" name="Title 1">
             <a:extLst>
               <a:ext uri="{FF2B5EF4-FFF2-40B4-BE49-F238E27FC236}">
-                <a16:creationId xmlns:a16="http://schemas.microsoft.com/office/drawing/2014/main" xmlns="" id="{19A84D10-1CE3-4440-9E21-70C1471000A8}"/>
+                <a16:creationId xmlns="" xmlns:a16="http://schemas.microsoft.com/office/drawing/2014/main" id="{19A84D10-1CE3-4440-9E21-70C1471000A8}"/>
               </a:ext>
             </a:extLst>
           </p:cNvPr>
@@ -5869,7 +5868,7 @@
           <p:cNvPr id="3" name="Content Placeholder 2">
             <a:extLst>
               <a:ext uri="{FF2B5EF4-FFF2-40B4-BE49-F238E27FC236}">
-                <a16:creationId xmlns:a16="http://schemas.microsoft.com/office/drawing/2014/main" xmlns="" id="{55567A0D-A607-2A40-9D63-1E72C786320C}"/>
+                <a16:creationId xmlns="" xmlns:a16="http://schemas.microsoft.com/office/drawing/2014/main" id="{55567A0D-A607-2A40-9D63-1E72C786320C}"/>
               </a:ext>
             </a:extLst>
           </p:cNvPr>
@@ -5965,7 +5964,7 @@
           <p:cNvPr id="4" name="Text Placeholder 3">
             <a:extLst>
               <a:ext uri="{FF2B5EF4-FFF2-40B4-BE49-F238E27FC236}">
-                <a16:creationId xmlns:a16="http://schemas.microsoft.com/office/drawing/2014/main" xmlns="" id="{E9AD4E7A-54D4-6645-A6AF-C4324CC7448E}"/>
+                <a16:creationId xmlns="" xmlns:a16="http://schemas.microsoft.com/office/drawing/2014/main" id="{E9AD4E7A-54D4-6645-A6AF-C4324CC7448E}"/>
               </a:ext>
             </a:extLst>
           </p:cNvPr>
@@ -6041,7 +6040,7 @@
           <p:cNvPr id="8" name="Subtitle 2">
             <a:extLst>
               <a:ext uri="{FF2B5EF4-FFF2-40B4-BE49-F238E27FC236}">
-                <a16:creationId xmlns:a16="http://schemas.microsoft.com/office/drawing/2014/main" xmlns="" id="{4DBA3354-AC19-2F4D-8C9F-CE6BD155BFFD}"/>
+                <a16:creationId xmlns="" xmlns:a16="http://schemas.microsoft.com/office/drawing/2014/main" id="{4DBA3354-AC19-2F4D-8C9F-CE6BD155BFFD}"/>
               </a:ext>
             </a:extLst>
           </p:cNvPr>
@@ -6370,7 +6369,7 @@
           <a:p>
             <a:fld id="{A7818830-1741-9145-85B6-1992E2E577A1}" type="datetimeFigureOut">
               <a:rPr lang="en-US" smtClean="0"/>
-              <a:t>1/17/2020</a:t>
+              <a:t>2/12/2020</a:t>
             </a:fld>
             <a:endParaRPr lang="en-US"/>
           </a:p>
@@ -6453,7 +6452,7 @@
           <p:cNvPr id="13" name="Oval 12">
             <a:extLst>
               <a:ext uri="{FF2B5EF4-FFF2-40B4-BE49-F238E27FC236}">
-                <a16:creationId xmlns:a16="http://schemas.microsoft.com/office/drawing/2014/main" xmlns="" id="{B5043DA6-F6E2-B44B-966E-7681CBC26F69}"/>
+                <a16:creationId xmlns="" xmlns:a16="http://schemas.microsoft.com/office/drawing/2014/main" id="{B5043DA6-F6E2-B44B-966E-7681CBC26F69}"/>
               </a:ext>
             </a:extLst>
           </p:cNvPr>
@@ -6538,7 +6537,7 @@
           <p:cNvPr id="7" name="Picture 6">
             <a:extLst>
               <a:ext uri="{FF2B5EF4-FFF2-40B4-BE49-F238E27FC236}">
-                <a16:creationId xmlns:a16="http://schemas.microsoft.com/office/drawing/2014/main" xmlns="" id="{625CF0CE-D6FA-1C4B-B711-6852896E8E20}"/>
+                <a16:creationId xmlns="" xmlns:a16="http://schemas.microsoft.com/office/drawing/2014/main" id="{625CF0CE-D6FA-1C4B-B711-6852896E8E20}"/>
               </a:ext>
             </a:extLst>
           </p:cNvPr>
@@ -6568,7 +6567,7 @@
           <p:cNvPr id="3" name="Picture Placeholder 2">
             <a:extLst>
               <a:ext uri="{FF2B5EF4-FFF2-40B4-BE49-F238E27FC236}">
-                <a16:creationId xmlns:a16="http://schemas.microsoft.com/office/drawing/2014/main" xmlns="" id="{CE919A06-F4CD-CA4A-973D-806981699791}"/>
+                <a16:creationId xmlns="" xmlns:a16="http://schemas.microsoft.com/office/drawing/2014/main" id="{CE919A06-F4CD-CA4A-973D-806981699791}"/>
               </a:ext>
             </a:extLst>
           </p:cNvPr>
@@ -6645,7 +6644,7 @@
           <p:cNvPr id="10" name="Title 1">
             <a:extLst>
               <a:ext uri="{FF2B5EF4-FFF2-40B4-BE49-F238E27FC236}">
-                <a16:creationId xmlns:a16="http://schemas.microsoft.com/office/drawing/2014/main" xmlns="" id="{5E297C46-D278-1B45-850B-6B2A1027B762}"/>
+                <a16:creationId xmlns="" xmlns:a16="http://schemas.microsoft.com/office/drawing/2014/main" id="{5E297C46-D278-1B45-850B-6B2A1027B762}"/>
               </a:ext>
             </a:extLst>
           </p:cNvPr>
@@ -6696,7 +6695,7 @@
           <p:cNvPr id="11" name="Text Placeholder 3">
             <a:extLst>
               <a:ext uri="{FF2B5EF4-FFF2-40B4-BE49-F238E27FC236}">
-                <a16:creationId xmlns:a16="http://schemas.microsoft.com/office/drawing/2014/main" xmlns="" id="{B52E6762-2574-764E-99AC-78507C80B6B2}"/>
+                <a16:creationId xmlns="" xmlns:a16="http://schemas.microsoft.com/office/drawing/2014/main" id="{B52E6762-2574-764E-99AC-78507C80B6B2}"/>
               </a:ext>
             </a:extLst>
           </p:cNvPr>
@@ -6772,7 +6771,7 @@
           <p:cNvPr id="8" name="Subtitle 2">
             <a:extLst>
               <a:ext uri="{FF2B5EF4-FFF2-40B4-BE49-F238E27FC236}">
-                <a16:creationId xmlns:a16="http://schemas.microsoft.com/office/drawing/2014/main" xmlns="" id="{467691D8-A545-3E41-9DD3-01AC9CF7E822}"/>
+                <a16:creationId xmlns="" xmlns:a16="http://schemas.microsoft.com/office/drawing/2014/main" id="{467691D8-A545-3E41-9DD3-01AC9CF7E822}"/>
               </a:ext>
             </a:extLst>
           </p:cNvPr>
@@ -7014,7 +7013,7 @@
           <p:cNvPr id="11" name="Oval 10">
             <a:extLst>
               <a:ext uri="{FF2B5EF4-FFF2-40B4-BE49-F238E27FC236}">
-                <a16:creationId xmlns:a16="http://schemas.microsoft.com/office/drawing/2014/main" xmlns="" id="{700D70BF-0D78-8947-9B2F-B0F56FF5C8CF}"/>
+                <a16:creationId xmlns="" xmlns:a16="http://schemas.microsoft.com/office/drawing/2014/main" id="{700D70BF-0D78-8947-9B2F-B0F56FF5C8CF}"/>
               </a:ext>
             </a:extLst>
           </p:cNvPr>
@@ -7099,7 +7098,7 @@
           <p:cNvPr id="6" name="Picture 5">
             <a:extLst>
               <a:ext uri="{FF2B5EF4-FFF2-40B4-BE49-F238E27FC236}">
-                <a16:creationId xmlns:a16="http://schemas.microsoft.com/office/drawing/2014/main" xmlns="" id="{7315AAAC-7370-7942-9145-AAAC220B4436}"/>
+                <a16:creationId xmlns="" xmlns:a16="http://schemas.microsoft.com/office/drawing/2014/main" id="{7315AAAC-7370-7942-9145-AAAC220B4436}"/>
               </a:ext>
             </a:extLst>
           </p:cNvPr>
@@ -7129,7 +7128,7 @@
           <p:cNvPr id="3" name="Vertical Text Placeholder 2">
             <a:extLst>
               <a:ext uri="{FF2B5EF4-FFF2-40B4-BE49-F238E27FC236}">
-                <a16:creationId xmlns:a16="http://schemas.microsoft.com/office/drawing/2014/main" xmlns="" id="{05561771-F5B0-B740-831B-001696BB1FE6}"/>
+                <a16:creationId xmlns="" xmlns:a16="http://schemas.microsoft.com/office/drawing/2014/main" id="{05561771-F5B0-B740-831B-001696BB1FE6}"/>
               </a:ext>
             </a:extLst>
           </p:cNvPr>
@@ -7223,7 +7222,7 @@
           <p:cNvPr id="9" name="Title 1">
             <a:extLst>
               <a:ext uri="{FF2B5EF4-FFF2-40B4-BE49-F238E27FC236}">
-                <a16:creationId xmlns:a16="http://schemas.microsoft.com/office/drawing/2014/main" xmlns="" id="{478D8594-770D-2F41-980E-F79D6542DB14}"/>
+                <a16:creationId xmlns="" xmlns:a16="http://schemas.microsoft.com/office/drawing/2014/main" id="{478D8594-770D-2F41-980E-F79D6542DB14}"/>
               </a:ext>
             </a:extLst>
           </p:cNvPr>
@@ -7267,7 +7266,7 @@
           <p:cNvPr id="7" name="Subtitle 2">
             <a:extLst>
               <a:ext uri="{FF2B5EF4-FFF2-40B4-BE49-F238E27FC236}">
-                <a16:creationId xmlns:a16="http://schemas.microsoft.com/office/drawing/2014/main" xmlns="" id="{BEA5A1E9-D7B6-5340-947A-1F94DDAB71B4}"/>
+                <a16:creationId xmlns="" xmlns:a16="http://schemas.microsoft.com/office/drawing/2014/main" id="{BEA5A1E9-D7B6-5340-947A-1F94DDAB71B4}"/>
               </a:ext>
             </a:extLst>
           </p:cNvPr>
@@ -7509,7 +7508,7 @@
           <p:cNvPr id="10" name="Oval 9">
             <a:extLst>
               <a:ext uri="{FF2B5EF4-FFF2-40B4-BE49-F238E27FC236}">
-                <a16:creationId xmlns:a16="http://schemas.microsoft.com/office/drawing/2014/main" xmlns="" id="{AEA69870-3A9B-2042-8FC4-CF7E21655105}"/>
+                <a16:creationId xmlns="" xmlns:a16="http://schemas.microsoft.com/office/drawing/2014/main" id="{AEA69870-3A9B-2042-8FC4-CF7E21655105}"/>
               </a:ext>
             </a:extLst>
           </p:cNvPr>
@@ -7594,7 +7593,7 @@
           <p:cNvPr id="6" name="Picture 5">
             <a:extLst>
               <a:ext uri="{FF2B5EF4-FFF2-40B4-BE49-F238E27FC236}">
-                <a16:creationId xmlns:a16="http://schemas.microsoft.com/office/drawing/2014/main" xmlns="" id="{7C7138AB-8A50-4144-8785-65ED9116270F}"/>
+                <a16:creationId xmlns="" xmlns:a16="http://schemas.microsoft.com/office/drawing/2014/main" id="{7C7138AB-8A50-4144-8785-65ED9116270F}"/>
               </a:ext>
             </a:extLst>
           </p:cNvPr>
@@ -7624,7 +7623,7 @@
           <p:cNvPr id="2" name="Vertical Title 1">
             <a:extLst>
               <a:ext uri="{FF2B5EF4-FFF2-40B4-BE49-F238E27FC236}">
-                <a16:creationId xmlns:a16="http://schemas.microsoft.com/office/drawing/2014/main" xmlns="" id="{3B3286D1-A677-074D-8452-B6E481375AB6}"/>
+                <a16:creationId xmlns="" xmlns:a16="http://schemas.microsoft.com/office/drawing/2014/main" id="{3B3286D1-A677-074D-8452-B6E481375AB6}"/>
               </a:ext>
             </a:extLst>
           </p:cNvPr>
@@ -7668,7 +7667,7 @@
           <p:cNvPr id="3" name="Vertical Text Placeholder 2">
             <a:extLst>
               <a:ext uri="{FF2B5EF4-FFF2-40B4-BE49-F238E27FC236}">
-                <a16:creationId xmlns:a16="http://schemas.microsoft.com/office/drawing/2014/main" xmlns="" id="{DC30B674-98A5-8743-BF78-6CC7D5E7BE50}"/>
+                <a16:creationId xmlns="" xmlns:a16="http://schemas.microsoft.com/office/drawing/2014/main" id="{DC30B674-98A5-8743-BF78-6CC7D5E7BE50}"/>
               </a:ext>
             </a:extLst>
           </p:cNvPr>
@@ -7762,7 +7761,7 @@
           <p:cNvPr id="7" name="Subtitle 2">
             <a:extLst>
               <a:ext uri="{FF2B5EF4-FFF2-40B4-BE49-F238E27FC236}">
-                <a16:creationId xmlns:a16="http://schemas.microsoft.com/office/drawing/2014/main" xmlns="" id="{8A54A282-20C9-4C40-8406-9B5E456F4AAA}"/>
+                <a16:creationId xmlns="" xmlns:a16="http://schemas.microsoft.com/office/drawing/2014/main" id="{8A54A282-20C9-4C40-8406-9B5E456F4AAA}"/>
               </a:ext>
             </a:extLst>
           </p:cNvPr>
@@ -8167,7 +8166,7 @@
           <a:p>
             <a:fld id="{A7818830-1741-9145-85B6-1992E2E577A1}" type="datetimeFigureOut">
               <a:rPr lang="en-US" smtClean="0"/>
-              <a:t>1/17/2020</a:t>
+              <a:t>2/12/2020</a:t>
             </a:fld>
             <a:endParaRPr lang="en-US"/>
           </a:p>
@@ -8399,7 +8398,7 @@
           <a:p>
             <a:fld id="{A7818830-1741-9145-85B6-1992E2E577A1}" type="datetimeFigureOut">
               <a:rPr lang="en-US" smtClean="0"/>
-              <a:t>1/17/2020</a:t>
+              <a:t>2/12/2020</a:t>
             </a:fld>
             <a:endParaRPr lang="en-US"/>
           </a:p>
@@ -8766,7 +8765,7 @@
           <a:p>
             <a:fld id="{A7818830-1741-9145-85B6-1992E2E577A1}" type="datetimeFigureOut">
               <a:rPr lang="en-US" smtClean="0"/>
-              <a:t>1/17/2020</a:t>
+              <a:t>2/12/2020</a:t>
             </a:fld>
             <a:endParaRPr lang="en-US"/>
           </a:p>
@@ -8884,7 +8883,7 @@
           <a:p>
             <a:fld id="{A7818830-1741-9145-85B6-1992E2E577A1}" type="datetimeFigureOut">
               <a:rPr lang="en-US" smtClean="0"/>
-              <a:t>1/17/2020</a:t>
+              <a:t>2/12/2020</a:t>
             </a:fld>
             <a:endParaRPr lang="en-US"/>
           </a:p>
@@ -8979,7 +8978,7 @@
           <a:p>
             <a:fld id="{A7818830-1741-9145-85B6-1992E2E577A1}" type="datetimeFigureOut">
               <a:rPr lang="en-US" smtClean="0"/>
-              <a:t>1/17/2020</a:t>
+              <a:t>2/12/2020</a:t>
             </a:fld>
             <a:endParaRPr lang="en-US"/>
           </a:p>
@@ -9256,7 +9255,7 @@
           <a:p>
             <a:fld id="{A7818830-1741-9145-85B6-1992E2E577A1}" type="datetimeFigureOut">
               <a:rPr lang="en-US" smtClean="0"/>
-              <a:t>1/17/2020</a:t>
+              <a:t>2/12/2020</a:t>
             </a:fld>
             <a:endParaRPr lang="en-US"/>
           </a:p>
@@ -9509,7 +9508,7 @@
           <a:p>
             <a:fld id="{A7818830-1741-9145-85B6-1992E2E577A1}" type="datetimeFigureOut">
               <a:rPr lang="en-US" smtClean="0"/>
-              <a:t>1/17/2020</a:t>
+              <a:t>2/12/2020</a:t>
             </a:fld>
             <a:endParaRPr lang="en-US"/>
           </a:p>
@@ -9722,7 +9721,7 @@
           <a:p>
             <a:fld id="{A7818830-1741-9145-85B6-1992E2E577A1}" type="datetimeFigureOut">
               <a:rPr lang="en-US" smtClean="0"/>
-              <a:t>1/17/2020</a:t>
+              <a:t>2/12/2020</a:t>
             </a:fld>
             <a:endParaRPr lang="en-US"/>
           </a:p>
@@ -10481,7 +10480,7 @@
           <p:cNvPr id="2" name="Title 1">
             <a:extLst>
               <a:ext uri="{FF2B5EF4-FFF2-40B4-BE49-F238E27FC236}">
-                <a16:creationId xmlns:a16="http://schemas.microsoft.com/office/drawing/2014/main" xmlns="" id="{6FF6621C-6F45-B242-BB65-E518082388E2}"/>
+                <a16:creationId xmlns="" xmlns:a16="http://schemas.microsoft.com/office/drawing/2014/main" id="{6FF6621C-6F45-B242-BB65-E518082388E2}"/>
               </a:ext>
             </a:extLst>
           </p:cNvPr>
@@ -10541,7 +10540,7 @@
           <p:cNvPr id="3" name="Subtitle 2">
             <a:extLst>
               <a:ext uri="{FF2B5EF4-FFF2-40B4-BE49-F238E27FC236}">
-                <a16:creationId xmlns:a16="http://schemas.microsoft.com/office/drawing/2014/main" xmlns="" id="{EAE707F7-BC74-7A48-A8B4-5834787C5F5D}"/>
+                <a16:creationId xmlns="" xmlns:a16="http://schemas.microsoft.com/office/drawing/2014/main" id="{EAE707F7-BC74-7A48-A8B4-5834787C5F5D}"/>
               </a:ext>
             </a:extLst>
           </p:cNvPr>
@@ -11733,47 +11732,83 @@
         </p:nvSpPr>
         <p:spPr>
           <a:xfrm>
-            <a:off x="545123" y="1283676"/>
-            <a:ext cx="10808677" cy="5574324"/>
+            <a:off x="270165" y="1182811"/>
+            <a:ext cx="11904250" cy="5675189"/>
           </a:xfrm>
         </p:spPr>
         <p:txBody>
           <a:bodyPr>
-            <a:normAutofit fontScale="92500" lnSpcReduction="10000"/>
+            <a:normAutofit fontScale="92500" lnSpcReduction="20000"/>
           </a:bodyPr>
           <a:lstStyle/>
           <a:p>
-            <a:r>
-              <a:rPr lang="en-US" dirty="0" smtClean="0"/>
-              <a:t>The R Book</a:t>
-            </a:r>
-          </a:p>
-          <a:p>
-            <a:endParaRPr lang="en-US" dirty="0" smtClean="0"/>
-          </a:p>
-          <a:p>
+            <a:pPr marL="0" indent="0">
+              <a:buNone/>
+            </a:pPr>
             <a:r>
               <a:rPr lang="en-US" dirty="0" smtClean="0"/>
               <a:t>Confluence at STATCAN:</a:t>
             </a:r>
           </a:p>
           <a:p>
-            <a:pPr lvl="1"/>
-            <a:r>
-              <a:rPr lang="en-US" dirty="0" smtClean="0"/>
-              <a:t>Link </a:t>
-            </a:r>
-            <a:r>
-              <a:rPr lang="en-US" dirty="0" err="1" smtClean="0"/>
-              <a:t>heres</a:t>
-            </a:r>
-            <a:r>
-              <a:rPr lang="en-US" dirty="0" smtClean="0"/>
-              <a:t>!!!!</a:t>
-            </a:r>
-          </a:p>
-          <a:p>
-            <a:pPr lvl="1"/>
+            <a:r>
+              <a:rPr lang="en-CA" dirty="0"/>
+              <a:t>Presentations from the R user </a:t>
+            </a:r>
+            <a:r>
+              <a:rPr lang="en-CA" dirty="0" smtClean="0"/>
+              <a:t>group </a:t>
+            </a:r>
+            <a:r>
+              <a:rPr lang="en-CA" u="sng" dirty="0" smtClean="0">
+                <a:hlinkClick r:id="rId3"/>
+              </a:rPr>
+              <a:t>https</a:t>
+            </a:r>
+            <a:r>
+              <a:rPr lang="en-CA" u="sng" dirty="0">
+                <a:hlinkClick r:id="rId3"/>
+              </a:rPr>
+              <a:t>://confluence.statcan.ca/pages/viewpage.action?pageId=464393397</a:t>
+            </a:r>
+            <a:r>
+              <a:rPr lang="en-CA" dirty="0"/>
+              <a:t> </a:t>
+            </a:r>
+          </a:p>
+          <a:p>
+            <a:r>
+              <a:rPr lang="en-CA" dirty="0"/>
+              <a:t>R and Python cheat </a:t>
+            </a:r>
+            <a:r>
+              <a:rPr lang="en-CA" dirty="0" smtClean="0"/>
+              <a:t>sheets </a:t>
+            </a:r>
+            <a:r>
+              <a:rPr lang="en-CA" u="sng" dirty="0" smtClean="0">
+                <a:hlinkClick r:id="rId3"/>
+              </a:rPr>
+              <a:t>https</a:t>
+            </a:r>
+            <a:r>
+              <a:rPr lang="en-CA" u="sng" dirty="0">
+                <a:hlinkClick r:id="rId3"/>
+              </a:rPr>
+              <a:t>://</a:t>
+            </a:r>
+            <a:r>
+              <a:rPr lang="en-CA" u="sng" dirty="0" smtClean="0">
+                <a:hlinkClick r:id="rId3"/>
+              </a:rPr>
+              <a:t>confluence.statcan.ca/pages/viewpage.action?pageId=464393397</a:t>
+            </a:r>
+            <a:endParaRPr lang="en-CA" dirty="0"/>
+          </a:p>
+          <a:p>
+            <a:pPr marL="457200" lvl="1" indent="0">
+              <a:buNone/>
+            </a:pPr>
             <a:endParaRPr lang="en-US" dirty="0" smtClean="0"/>
           </a:p>
           <a:p>
@@ -11792,49 +11827,26 @@
             <a:r>
               <a:rPr lang="en-US" dirty="0" smtClean="0"/>
               <a:t>SWIRL: </a:t>
-            </a:r>
-            <a:r>
-              <a:rPr lang="en-US" dirty="0" smtClean="0">
-                <a:hlinkClick r:id="rId3"/>
-              </a:rPr>
-              <a:t>https://swirlstats.com/</a:t>
-            </a:r>
-            <a:endParaRPr lang="en-US" dirty="0" smtClean="0"/>
-          </a:p>
-          <a:p>
-            <a:pPr lvl="1"/>
-            <a:r>
-              <a:rPr lang="en-US" dirty="0" smtClean="0"/>
-              <a:t>Software Carpentry </a:t>
             </a:r>
             <a:r>
               <a:rPr lang="en-US" dirty="0" smtClean="0">
                 <a:hlinkClick r:id="rId4"/>
               </a:rPr>
-              <a:t>http://swcarpentry.github.io/r-novice-gapminder/</a:t>
+              <a:t>https://swirlstats.com/</a:t>
             </a:r>
             <a:endParaRPr lang="en-US" dirty="0" smtClean="0"/>
           </a:p>
           <a:p>
-            <a:endParaRPr lang="en-US" dirty="0" smtClean="0"/>
-          </a:p>
-          <a:p>
-            <a:r>
-              <a:rPr lang="en-US" dirty="0" err="1" smtClean="0"/>
-              <a:t>Viz</a:t>
-            </a:r>
+            <a:pPr lvl="1"/>
             <a:r>
               <a:rPr lang="en-US" dirty="0" smtClean="0"/>
-              <a:t> gallery:</a:t>
-            </a:r>
-          </a:p>
-          <a:p>
-            <a:pPr lvl="1"/>
+              <a:t>Software Carpentry </a:t>
+            </a:r>
             <a:r>
               <a:rPr lang="en-US" dirty="0" smtClean="0">
                 <a:hlinkClick r:id="rId5"/>
               </a:rPr>
-              <a:t>http://www.sthda.com/english/articles/24-ggpubr-publication-ready-plots/</a:t>
+              <a:t>http://swcarpentry.github.io/r-novice-gapminder/</a:t>
             </a:r>
             <a:endParaRPr lang="en-US" dirty="0" smtClean="0"/>
           </a:p>
@@ -11843,8 +11855,12 @@
           </a:p>
           <a:p>
             <a:r>
+              <a:rPr lang="en-US" dirty="0" err="1" smtClean="0"/>
+              <a:t>Viz</a:t>
+            </a:r>
+            <a:r>
               <a:rPr lang="en-US" dirty="0" smtClean="0"/>
-              <a:t>Reproducible Research text book </a:t>
+              <a:t> gallery:</a:t>
             </a:r>
           </a:p>
           <a:p>
@@ -11853,6 +11869,25 @@
               <a:rPr lang="en-US" dirty="0" smtClean="0">
                 <a:hlinkClick r:id="rId6"/>
               </a:rPr>
+              <a:t>http://www.sthda.com/english/articles/24-ggpubr-publication-ready-plots/</a:t>
+            </a:r>
+            <a:endParaRPr lang="en-US" dirty="0" smtClean="0"/>
+          </a:p>
+          <a:p>
+            <a:endParaRPr lang="en-US" dirty="0" smtClean="0"/>
+          </a:p>
+          <a:p>
+            <a:r>
+              <a:rPr lang="en-US" dirty="0" smtClean="0"/>
+              <a:t>Reproducible Research text book </a:t>
+            </a:r>
+          </a:p>
+          <a:p>
+            <a:pPr lvl="1"/>
+            <a:r>
+              <a:rPr lang="en-US" dirty="0" smtClean="0">
+                <a:hlinkClick r:id="rId7"/>
+              </a:rPr>
               <a:t>https://github.com/christophergandrud/Rep-Res-Book</a:t>
             </a:r>
             <a:endParaRPr lang="en-US" dirty="0"/>
@@ -11866,36 +11901,6 @@
           </a:p>
         </p:txBody>
       </p:sp>
-      <p:pic>
-        <p:nvPicPr>
-          <p:cNvPr id="4" name="Picture 3"/>
-          <p:cNvPicPr>
-            <a:picLocks noChangeAspect="1"/>
-          </p:cNvPicPr>
-          <p:nvPr/>
-        </p:nvPicPr>
-        <p:blipFill>
-          <a:blip r:embed="rId7">
-            <a:extLst>
-              <a:ext uri="{28A0092B-C50C-407E-A947-70E740481C1C}">
-                <a14:useLocalDpi xmlns:a14="http://schemas.microsoft.com/office/drawing/2010/main" val="0"/>
-              </a:ext>
-            </a:extLst>
-          </a:blip>
-          <a:stretch>
-            <a:fillRect/>
-          </a:stretch>
-        </p:blipFill>
-        <p:spPr>
-          <a:xfrm>
-            <a:off x="7496374" y="1074736"/>
-            <a:ext cx="1854200" cy="2286000"/>
-          </a:xfrm>
-          <a:prstGeom prst="rect">
-            <a:avLst/>
-          </a:prstGeom>
-        </p:spPr>
-      </p:pic>
       <p:sp>
         <p:nvSpPr>
           <p:cNvPr id="5" name="Text Box 8"/>
@@ -12140,8 +12145,8 @@
         </p:nvSpPr>
         <p:spPr>
           <a:xfrm>
-            <a:off x="378068" y="1690688"/>
-            <a:ext cx="9117626" cy="4850789"/>
+            <a:off x="378068" y="1182812"/>
+            <a:ext cx="9117626" cy="5675188"/>
           </a:xfrm>
         </p:spPr>
         <p:txBody>
@@ -12150,16 +12155,17 @@
           </a:bodyPr>
           <a:lstStyle/>
           <a:p>
+            <a:pPr marL="0" indent="0">
+              <a:buNone/>
+            </a:pPr>
             <a:r>
               <a:rPr lang="en-US" dirty="0" smtClean="0"/>
-              <a:t>R for Data Science</a:t>
-            </a:r>
-            <a:endParaRPr lang="en-US" dirty="0" smtClean="0">
-              <a:hlinkClick r:id="rId3"/>
-            </a:endParaRPr>
-          </a:p>
-          <a:p>
-            <a:pPr lvl="1"/>
+              <a:t>R for Data Science: </a:t>
+            </a:r>
+            <a:r>
+              <a:rPr lang="en-US" dirty="0"/>
+              <a:t> </a:t>
+            </a:r>
             <a:r>
               <a:rPr lang="en-US" dirty="0" smtClean="0">
                 <a:hlinkClick r:id="rId3"/>
@@ -12181,10 +12187,30 @@
             <a:endParaRPr lang="en-US" dirty="0" smtClean="0"/>
           </a:p>
           <a:p>
-            <a:pPr lvl="1"/>
-            <a:endParaRPr lang="en-US" dirty="0" smtClean="0"/>
-          </a:p>
-          <a:p>
+            <a:pPr marL="0" indent="0">
+              <a:buNone/>
+            </a:pPr>
+            <a:endParaRPr lang="en-US" sz="500" dirty="0" smtClean="0"/>
+          </a:p>
+          <a:p>
+            <a:pPr marL="0" indent="0">
+              <a:buNone/>
+            </a:pPr>
+            <a:r>
+              <a:rPr lang="en-US" dirty="0" smtClean="0"/>
+              <a:t>The R Book</a:t>
+            </a:r>
+          </a:p>
+          <a:p>
+            <a:pPr marL="0" indent="0">
+              <a:buNone/>
+            </a:pPr>
+            <a:endParaRPr lang="en-US" sz="500" dirty="0" smtClean="0"/>
+          </a:p>
+          <a:p>
+            <a:pPr marL="0" indent="0">
+              <a:buNone/>
+            </a:pPr>
             <a:r>
               <a:rPr lang="en-US" dirty="0" smtClean="0"/>
               <a:t>Software Carpentry R Programming</a:t>
@@ -12207,32 +12233,51 @@
             <a:endParaRPr lang="en-US" dirty="0" smtClean="0"/>
           </a:p>
           <a:p>
+            <a:pPr marL="0" indent="0">
+              <a:buNone/>
+            </a:pPr>
+            <a:endParaRPr lang="en-US" dirty="0" smtClean="0"/>
+          </a:p>
+          <a:p>
+            <a:pPr marL="0" indent="0">
+              <a:buNone/>
+            </a:pPr>
             <a:r>
               <a:rPr lang="en-US" dirty="0" smtClean="0"/>
-              <a:t>Data Camp</a:t>
-            </a:r>
-          </a:p>
-          <a:p>
-            <a:pPr lvl="1"/>
+              <a:t>Data Camp: </a:t>
+            </a:r>
+            <a:r>
+              <a:rPr lang="en-US" dirty="0" smtClean="0">
+                <a:hlinkClick r:id="rId5"/>
+              </a:rPr>
+              <a:t>https</a:t>
+            </a:r>
             <a:r>
               <a:rPr lang="en-US" dirty="0">
                 <a:hlinkClick r:id="rId5"/>
               </a:rPr>
-              <a:t>https://www.statmethods.net/index.html</a:t>
+              <a:t>://www.statmethods.net/index.html</a:t>
             </a:r>
             <a:endParaRPr lang="en-US" dirty="0" smtClean="0"/>
           </a:p>
           <a:p>
+            <a:pPr marL="0" indent="0">
+              <a:buNone/>
+            </a:pPr>
+            <a:endParaRPr lang="en-US" sz="500" dirty="0" smtClean="0"/>
+          </a:p>
+          <a:p>
+            <a:pPr marL="0" indent="0">
+              <a:buNone/>
+            </a:pPr>
             <a:r>
               <a:rPr lang="en-US" dirty="0" smtClean="0"/>
               <a:t>Toward Data Science:</a:t>
             </a:r>
-            <a:endParaRPr lang="en-US" dirty="0" smtClean="0">
-              <a:hlinkClick r:id="rId6"/>
-            </a:endParaRPr>
-          </a:p>
-          <a:p>
-            <a:pPr lvl="1"/>
+            <a:r>
+              <a:rPr lang="en-US" dirty="0"/>
+              <a:t> </a:t>
+            </a:r>
             <a:r>
               <a:rPr lang="en-US" dirty="0" smtClean="0">
                 <a:hlinkClick r:id="rId6"/>
@@ -12254,10 +12299,51 @@
             <a:endParaRPr lang="en-US" dirty="0"/>
           </a:p>
           <a:p>
+            <a:pPr marL="0" indent="0">
+              <a:buNone/>
+            </a:pPr>
+            <a:endParaRPr lang="en-US" sz="500" dirty="0" smtClean="0"/>
+          </a:p>
+          <a:p>
+            <a:pPr marL="0" indent="0">
+              <a:buNone/>
+            </a:pPr>
             <a:r>
               <a:rPr lang="en-US" dirty="0" smtClean="0"/>
               <a:t>Stack overflow</a:t>
             </a:r>
+          </a:p>
+          <a:p>
+            <a:pPr marL="0" indent="0">
+              <a:buNone/>
+            </a:pPr>
+            <a:r>
+              <a:rPr lang="en-US" dirty="0" err="1" smtClean="0"/>
+              <a:t>Github</a:t>
+            </a:r>
+            <a:r>
+              <a:rPr lang="en-US" smtClean="0"/>
+              <a:t>: </a:t>
+            </a:r>
+            <a:r>
+              <a:rPr lang="en-CA" u="sng" smtClean="0">
+                <a:hlinkClick r:id="rId7"/>
+              </a:rPr>
+              <a:t>https</a:t>
+            </a:r>
+            <a:r>
+              <a:rPr lang="en-CA" u="sng" dirty="0">
+                <a:hlinkClick r:id="rId7"/>
+              </a:rPr>
+              <a:t>://ubc-dsci.github.io/introduction-to-datascience/index.html</a:t>
+            </a:r>
+            <a:endParaRPr lang="en-CA" dirty="0"/>
+          </a:p>
+          <a:p>
+            <a:pPr marL="0" indent="0">
+              <a:buNone/>
+            </a:pPr>
+            <a:endParaRPr lang="en-US" dirty="0" smtClean="0"/>
           </a:p>
         </p:txBody>
       </p:sp>
@@ -12270,7 +12356,7 @@
           <p:nvPr/>
         </p:nvPicPr>
         <p:blipFill>
-          <a:blip r:embed="rId7">
+          <a:blip r:embed="rId8">
             <a:extLst>
               <a:ext uri="{28A0092B-C50C-407E-A947-70E740481C1C}">
                 <a14:useLocalDpi xmlns:a14="http://schemas.microsoft.com/office/drawing/2010/main" val="0"/>
@@ -12284,7 +12370,7 @@
         </p:blipFill>
         <p:spPr bwMode="auto">
           <a:xfrm>
-            <a:off x="9495694" y="1549644"/>
+            <a:off x="9495694" y="1037492"/>
             <a:ext cx="2318238" cy="3477357"/>
           </a:xfrm>
           <a:prstGeom prst="rect">
@@ -12469,127 +12555,40 @@
           </a:p>
         </p:txBody>
       </p:sp>
+      <p:pic>
+        <p:nvPicPr>
+          <p:cNvPr id="6" name="Picture 5"/>
+          <p:cNvPicPr>
+            <a:picLocks noChangeAspect="1"/>
+          </p:cNvPicPr>
+          <p:nvPr/>
+        </p:nvPicPr>
+        <p:blipFill>
+          <a:blip r:embed="rId9">
+            <a:extLst>
+              <a:ext uri="{28A0092B-C50C-407E-A947-70E740481C1C}">
+                <a14:useLocalDpi xmlns:a14="http://schemas.microsoft.com/office/drawing/2010/main" val="0"/>
+              </a:ext>
+            </a:extLst>
+          </a:blip>
+          <a:stretch>
+            <a:fillRect/>
+          </a:stretch>
+        </p:blipFill>
+        <p:spPr>
+          <a:xfrm>
+            <a:off x="9959732" y="4660168"/>
+            <a:ext cx="1854200" cy="2286000"/>
+          </a:xfrm>
+          <a:prstGeom prst="rect">
+            <a:avLst/>
+          </a:prstGeom>
+        </p:spPr>
+      </p:pic>
     </p:spTree>
     <p:extLst>
       <p:ext uri="{BB962C8B-B14F-4D97-AF65-F5344CB8AC3E}">
         <p14:creationId xmlns:p14="http://schemas.microsoft.com/office/powerpoint/2010/main" val="753150340"/>
-      </p:ext>
-    </p:extLst>
-  </p:cSld>
-  <p:clrMapOvr>
-    <a:masterClrMapping/>
-  </p:clrMapOvr>
-  <p:timing>
-    <p:tnLst>
-      <p:par>
-        <p:cTn id="1" dur="indefinite" restart="never" nodeType="tmRoot"/>
-      </p:par>
-    </p:tnLst>
-  </p:timing>
-</p:sld>
-</file>
-
-<file path=ppt/slides/slide15.xml><?xml version="1.0" encoding="utf-8"?>
-<p:sld xmlns:a="http://schemas.openxmlformats.org/drawingml/2006/main" xmlns:r="http://schemas.openxmlformats.org/officeDocument/2006/relationships" xmlns:p="http://schemas.openxmlformats.org/presentationml/2006/main">
-  <p:cSld>
-    <p:spTree>
-      <p:nvGrpSpPr>
-        <p:cNvPr id="1" name=""/>
-        <p:cNvGrpSpPr/>
-        <p:nvPr/>
-      </p:nvGrpSpPr>
-      <p:grpSpPr>
-        <a:xfrm>
-          <a:off x="0" y="0"/>
-          <a:ext cx="0" cy="0"/>
-          <a:chOff x="0" y="0"/>
-          <a:chExt cx="0" cy="0"/>
-        </a:xfrm>
-      </p:grpSpPr>
-      <p:sp>
-        <p:nvSpPr>
-          <p:cNvPr id="2" name="Title 1"/>
-          <p:cNvSpPr>
-            <a:spLocks noGrp="1"/>
-          </p:cNvSpPr>
-          <p:nvPr>
-            <p:ph type="title"/>
-          </p:nvPr>
-        </p:nvSpPr>
-        <p:spPr/>
-        <p:txBody>
-          <a:bodyPr/>
-          <a:lstStyle/>
-          <a:p>
-            <a:endParaRPr lang="en-CA"/>
-          </a:p>
-        </p:txBody>
-      </p:sp>
-      <p:sp>
-        <p:nvSpPr>
-          <p:cNvPr id="3" name="Content Placeholder 2"/>
-          <p:cNvSpPr>
-            <a:spLocks noGrp="1"/>
-          </p:cNvSpPr>
-          <p:nvPr>
-            <p:ph idx="1"/>
-          </p:nvPr>
-        </p:nvSpPr>
-        <p:spPr/>
-        <p:txBody>
-          <a:bodyPr/>
-          <a:lstStyle/>
-          <a:p>
-            <a:r>
-              <a:rPr lang="en-CA" dirty="0" err="1"/>
-              <a:t>install.packages</a:t>
-            </a:r>
-            <a:r>
-              <a:rPr lang="en-CA" dirty="0"/>
-              <a:t>("//fld6filer/</a:t>
-            </a:r>
-            <a:r>
-              <a:rPr lang="en-CA" dirty="0" err="1"/>
-              <a:t>packagerepo-depotprogiciel</a:t>
-            </a:r>
-            <a:r>
-              <a:rPr lang="en-CA" dirty="0"/>
-              <a:t>/</a:t>
-            </a:r>
-            <a:r>
-              <a:rPr lang="en-CA" dirty="0" err="1"/>
-              <a:t>miniCRAN</a:t>
-            </a:r>
-            <a:r>
-              <a:rPr lang="en-CA" dirty="0"/>
-              <a:t>/bin/windows/</a:t>
-            </a:r>
-            <a:r>
-              <a:rPr lang="en-CA" dirty="0" err="1"/>
-              <a:t>contrib</a:t>
-            </a:r>
-            <a:r>
-              <a:rPr lang="en-CA" dirty="0"/>
-              <a:t>/3.4/dplyr_0.7.6.zip", repos = NULL, type = "</a:t>
-            </a:r>
-            <a:r>
-              <a:rPr lang="en-CA" dirty="0" err="1"/>
-              <a:t>win.binary",dependencies</a:t>
-            </a:r>
-            <a:r>
-              <a:rPr lang="en-CA"/>
-              <a:t> = TRUE)</a:t>
-            </a:r>
-          </a:p>
-          <a:p>
-            <a:endParaRPr lang="en-CA"/>
-          </a:p>
-        </p:txBody>
-      </p:sp>
-    </p:spTree>
-    <p:extLst>
-      <p:ext uri="{BB962C8B-B14F-4D97-AF65-F5344CB8AC3E}">
-        <p14:creationId xmlns:p14="http://schemas.microsoft.com/office/powerpoint/2010/main" val="1528801701"/>
       </p:ext>
     </p:extLst>
   </p:cSld>
@@ -12943,8 +12942,13 @@
             </a:r>
             <a:r>
               <a:rPr lang="en-US" dirty="0" smtClean="0"/>
-              <a:t>, mutate, arrange</a:t>
-            </a:r>
+              <a:t>, mutate, </a:t>
+            </a:r>
+            <a:r>
+              <a:rPr lang="en-US" dirty="0" smtClean="0"/>
+              <a:t>arrange, joins</a:t>
+            </a:r>
+            <a:endParaRPr lang="en-US" dirty="0" smtClean="0"/>
           </a:p>
           <a:p>
             <a:pPr lvl="1"/>
@@ -13777,19 +13781,52 @@
             <p:ph idx="1"/>
           </p:nvPr>
         </p:nvSpPr>
-        <p:spPr/>
+        <p:spPr>
+          <a:xfrm>
+            <a:off x="561109" y="1325563"/>
+            <a:ext cx="10792691" cy="4560454"/>
+          </a:xfrm>
+        </p:spPr>
         <p:txBody>
           <a:bodyPr>
-            <a:normAutofit fontScale="92500" lnSpcReduction="10000"/>
+            <a:normAutofit fontScale="85000" lnSpcReduction="20000"/>
           </a:bodyPr>
           <a:lstStyle/>
           <a:p>
+            <a:r>
+              <a:rPr lang="en-CA" dirty="0" smtClean="0"/>
+              <a:t>CRAN</a:t>
+            </a:r>
+            <a:endParaRPr lang="en-US" dirty="0"/>
+          </a:p>
+          <a:p>
+            <a:pPr marL="0" indent="0">
+              <a:buNone/>
+            </a:pPr>
             <a:r>
               <a:rPr lang="en-US" dirty="0" smtClean="0">
                 <a:hlinkClick r:id="rId3"/>
               </a:rPr>
-              <a:t>https://cran.r-project.org/</a:t>
-            </a:r>
+              <a:t>https</a:t>
+            </a:r>
+            <a:r>
+              <a:rPr lang="en-US" dirty="0" smtClean="0">
+                <a:hlinkClick r:id="rId3"/>
+              </a:rPr>
+              <a:t>://cran.r-project.org</a:t>
+            </a:r>
+            <a:r>
+              <a:rPr lang="en-US" dirty="0" smtClean="0">
+                <a:hlinkClick r:id="rId3"/>
+              </a:rPr>
+              <a:t>/</a:t>
+            </a:r>
+            <a:endParaRPr lang="en-US" dirty="0" smtClean="0"/>
+          </a:p>
+          <a:p>
+            <a:pPr marL="0" indent="0">
+              <a:buNone/>
+            </a:pPr>
             <a:endParaRPr lang="en-US" dirty="0" smtClean="0"/>
           </a:p>
           <a:p>
@@ -13802,11 +13839,7 @@
             <a:pPr lvl="1"/>
             <a:r>
               <a:rPr lang="en-US" dirty="0" smtClean="0"/>
-              <a:t>R/Python User Group Net </a:t>
-            </a:r>
-            <a:r>
-              <a:rPr lang="en-US" dirty="0" smtClean="0"/>
-              <a:t>A:</a:t>
+              <a:t>R/Python User Group Net A:</a:t>
             </a:r>
           </a:p>
           <a:p>

</xml_diff>